<commit_message>
Adding equations and some theory
</commit_message>
<xml_diff>
--- a/documentation/poster/poster.pptx
+++ b/documentation/poster/poster.pptx
@@ -5,15 +5,16 @@
     <p:sldMasterId id="2147483648" r:id="rId1"/>
   </p:sldMasterIdLst>
   <p:notesMasterIdLst>
-    <p:notesMasterId r:id="rId5"/>
+    <p:notesMasterId r:id="rId6"/>
   </p:notesMasterIdLst>
   <p:handoutMasterIdLst>
-    <p:handoutMasterId r:id="rId6"/>
+    <p:handoutMasterId r:id="rId7"/>
   </p:handoutMasterIdLst>
   <p:sldIdLst>
     <p:sldId id="256" r:id="rId2"/>
     <p:sldId id="257" r:id="rId3"/>
     <p:sldId id="258" r:id="rId4"/>
+    <p:sldId id="259" r:id="rId5"/>
   </p:sldIdLst>
   <p:sldSz cx="32918400" cy="21945600"/>
   <p:notesSz cx="6858000" cy="9144000"/>
@@ -4601,179 +4602,10 @@
               </a:rPr>
               <a:t>Lunar Lander game.</a:t>
             </a:r>
-            <a:endParaRPr lang="en-US" sz="2800" dirty="0">
+            <a:endParaRPr lang="en-US" sz="2600" dirty="0">
               <a:latin typeface="Optima" charset="0"/>
               <a:ea typeface="Optima" charset="0"/>
               <a:cs typeface="Optima" charset="0"/>
-            </a:endParaRPr>
-          </a:p>
-        </p:txBody>
-      </p:sp>
-      <p:sp>
-        <p:nvSpPr>
-          <p:cNvPr id="8" name="TextBox 7"/>
-          <p:cNvSpPr txBox="1"/>
-          <p:nvPr/>
-        </p:nvSpPr>
-        <p:spPr>
-          <a:xfrm>
-            <a:off x="10749647" y="14202090"/>
-            <a:ext cx="10508183" cy="7048083"/>
-          </a:xfrm>
-          <a:prstGeom prst="rect">
-            <a:avLst/>
-          </a:prstGeom>
-          <a:solidFill>
-            <a:schemeClr val="bg1">
-              <a:lumMod val="95000"/>
-            </a:schemeClr>
-          </a:solidFill>
-          <a:ln>
-            <a:solidFill>
-              <a:schemeClr val="accent2"/>
-            </a:solidFill>
-          </a:ln>
-          <a:effectLst>
-            <a:outerShdw blurRad="50800" dist="38100" dir="2700000" algn="tl" rotWithShape="0">
-              <a:prstClr val="black">
-                <a:alpha val="40000"/>
-              </a:prstClr>
-            </a:outerShdw>
-          </a:effectLst>
-        </p:spPr>
-        <p:txBody>
-          <a:bodyPr wrap="square">
-            <a:spAutoFit/>
-          </a:bodyPr>
-          <a:lstStyle/>
-          <a:p>
-            <a:pPr eaLnBrk="1" hangingPunct="1"/>
-            <a:r>
-              <a:rPr lang="en-US" sz="3200" b="1" u="sng" dirty="0" err="1" smtClean="0">
-                <a:solidFill>
-                  <a:srgbClr val="C00000"/>
-                </a:solidFill>
-                <a:latin typeface="Optima" charset="0"/>
-                <a:ea typeface="Optima" charset="0"/>
-                <a:cs typeface="Optima" charset="0"/>
-              </a:rPr>
-              <a:t>Hyperparameters</a:t>
-            </a:r>
-            <a:endParaRPr lang="en-US" altLang="en-US" sz="3200" dirty="0"/>
-          </a:p>
-          <a:p>
-            <a:pPr marL="571500" indent="-571500" eaLnBrk="1" hangingPunct="1">
-              <a:buFontTx/>
-              <a:buChar char="-"/>
-            </a:pPr>
-            <a:r>
-              <a:rPr lang="en-US" altLang="en-US" sz="3600" dirty="0" smtClean="0">
-                <a:latin typeface="Courier" charset="0"/>
-                <a:ea typeface="Courier" charset="0"/>
-                <a:cs typeface="Courier" charset="0"/>
-              </a:rPr>
-              <a:t>Add table for </a:t>
-            </a:r>
-            <a:r>
-              <a:rPr lang="en-US" altLang="en-US" sz="3600" dirty="0" err="1" smtClean="0">
-                <a:latin typeface="Courier" charset="0"/>
-                <a:ea typeface="Courier" charset="0"/>
-                <a:cs typeface="Courier" charset="0"/>
-              </a:rPr>
-              <a:t>hyperparameters</a:t>
-            </a:r>
-            <a:endParaRPr lang="en-US" altLang="en-US" sz="3600" dirty="0" smtClean="0">
-              <a:latin typeface="Courier" charset="0"/>
-              <a:ea typeface="Courier" charset="0"/>
-              <a:cs typeface="Courier" charset="0"/>
-            </a:endParaRPr>
-          </a:p>
-          <a:p>
-            <a:pPr eaLnBrk="1" hangingPunct="1"/>
-            <a:endParaRPr lang="en-US" altLang="en-US" sz="3600" dirty="0" smtClean="0">
-              <a:latin typeface="Courier" charset="0"/>
-              <a:ea typeface="Courier" charset="0"/>
-              <a:cs typeface="Courier" charset="0"/>
-            </a:endParaRPr>
-          </a:p>
-          <a:p>
-            <a:pPr eaLnBrk="1" hangingPunct="1"/>
-            <a:endParaRPr lang="en-US" altLang="en-US" sz="3600" dirty="0">
-              <a:latin typeface="Courier" charset="0"/>
-              <a:ea typeface="Courier" charset="0"/>
-              <a:cs typeface="Courier" charset="0"/>
-            </a:endParaRPr>
-          </a:p>
-          <a:p>
-            <a:pPr eaLnBrk="1" hangingPunct="1"/>
-            <a:endParaRPr lang="en-US" altLang="en-US" sz="3600" dirty="0" smtClean="0">
-              <a:latin typeface="Courier" charset="0"/>
-              <a:ea typeface="Courier" charset="0"/>
-              <a:cs typeface="Courier" charset="0"/>
-            </a:endParaRPr>
-          </a:p>
-          <a:p>
-            <a:pPr eaLnBrk="1" hangingPunct="1"/>
-            <a:endParaRPr lang="en-US" altLang="en-US" sz="3600" dirty="0">
-              <a:latin typeface="Courier" charset="0"/>
-              <a:ea typeface="Courier" charset="0"/>
-              <a:cs typeface="Courier" charset="0"/>
-            </a:endParaRPr>
-          </a:p>
-          <a:p>
-            <a:pPr eaLnBrk="1" hangingPunct="1"/>
-            <a:endParaRPr lang="en-US" altLang="en-US" sz="3600" dirty="0" smtClean="0">
-              <a:latin typeface="Courier" charset="0"/>
-              <a:ea typeface="Courier" charset="0"/>
-              <a:cs typeface="Courier" charset="0"/>
-            </a:endParaRPr>
-          </a:p>
-          <a:p>
-            <a:pPr eaLnBrk="1" hangingPunct="1"/>
-            <a:endParaRPr lang="en-US" altLang="en-US" sz="3600" dirty="0">
-              <a:latin typeface="Courier" charset="0"/>
-              <a:ea typeface="Courier" charset="0"/>
-              <a:cs typeface="Courier" charset="0"/>
-            </a:endParaRPr>
-          </a:p>
-          <a:p>
-            <a:pPr eaLnBrk="1" hangingPunct="1"/>
-            <a:endParaRPr lang="en-US" altLang="en-US" sz="3600" dirty="0" smtClean="0">
-              <a:latin typeface="Courier" charset="0"/>
-              <a:ea typeface="Courier" charset="0"/>
-              <a:cs typeface="Courier" charset="0"/>
-            </a:endParaRPr>
-          </a:p>
-          <a:p>
-            <a:pPr eaLnBrk="1" hangingPunct="1"/>
-            <a:endParaRPr lang="en-US" altLang="en-US" sz="3600" dirty="0">
-              <a:latin typeface="Courier" charset="0"/>
-              <a:ea typeface="Courier" charset="0"/>
-              <a:cs typeface="Courier" charset="0"/>
-            </a:endParaRPr>
-          </a:p>
-          <a:p>
-            <a:pPr eaLnBrk="1" hangingPunct="1"/>
-            <a:endParaRPr lang="en-US" altLang="en-US" sz="3600" dirty="0" smtClean="0">
-              <a:latin typeface="Courier" charset="0"/>
-              <a:ea typeface="Courier" charset="0"/>
-              <a:cs typeface="Courier" charset="0"/>
-            </a:endParaRPr>
-          </a:p>
-          <a:p>
-            <a:pPr eaLnBrk="1" hangingPunct="1"/>
-            <a:endParaRPr lang="en-US" altLang="en-US" sz="3600" dirty="0">
-              <a:latin typeface="Courier" charset="0"/>
-              <a:ea typeface="Courier" charset="0"/>
-              <a:cs typeface="Courier" charset="0"/>
-            </a:endParaRPr>
-          </a:p>
-          <a:p>
-            <a:pPr eaLnBrk="1" hangingPunct="1"/>
-            <a:endParaRPr lang="en-US" altLang="en-US" sz="2400" dirty="0">
-              <a:latin typeface="Courier" charset="0"/>
-              <a:ea typeface="Courier" charset="0"/>
-              <a:cs typeface="Courier" charset="0"/>
             </a:endParaRPr>
           </a:p>
         </p:txBody>
@@ -4791,7 +4623,7 @@
             <p:spPr bwMode="auto">
               <a:xfrm>
                 <a:off x="10747019" y="3363308"/>
-                <a:ext cx="10510811" cy="12431032"/>
+                <a:ext cx="10510811" cy="17173804"/>
               </a:xfrm>
               <a:prstGeom prst="rect">
                 <a:avLst/>
@@ -4867,7 +4699,7 @@
                     <a:ea typeface="Optima" charset="0"/>
                     <a:cs typeface="Optima" charset="0"/>
                   </a:rPr>
-                  <a:t>Full DQN:</a:t>
+                  <a:t>1. Full DQN:</a:t>
                 </a:r>
                 <a:r>
                   <a:rPr lang="en-US" sz="2800" b="1" dirty="0" smtClean="0">
@@ -4879,6 +4711,69 @@
                     <a:cs typeface="Optima" charset="0"/>
                   </a:rPr>
                   <a:t> </a:t>
+                </a:r>
+              </a:p>
+              <a:p>
+                <a:pPr marL="457200" lvl="0" indent="-457200" algn="just" eaLnBrk="1" hangingPunct="1">
+                  <a:buFont typeface="Arial" charset="0"/>
+                  <a:buChar char="•"/>
+                </a:pPr>
+                <a:r>
+                  <a:rPr lang="en-US" sz="2800" dirty="0" smtClean="0">
+                    <a:latin typeface="Optima" charset="0"/>
+                    <a:ea typeface="Optima" charset="0"/>
+                    <a:cs typeface="Optima" charset="0"/>
+                  </a:rPr>
+                  <a:t>Separate Target network</a:t>
+                </a:r>
+                <a:r>
+                  <a:rPr lang="en-US" sz="2800" dirty="0">
+                    <a:ea typeface="Cambria Math" charset="0"/>
+                    <a:cs typeface="Cambria Math" charset="0"/>
+                  </a:rPr>
+                  <a:t> </a:t>
+                </a:r>
+                <a14:m>
+                  <m:oMath xmlns:m="http://schemas.openxmlformats.org/officeDocument/2006/math">
+                    <m:acc>
+                      <m:accPr>
+                        <m:chr m:val="̃"/>
+                        <m:ctrlPr>
+                          <a:rPr lang="en-US" sz="2800" i="1" smtClean="0">
+                            <a:latin typeface="Cambria Math" charset="0"/>
+                            <a:ea typeface="Cambria Math" charset="0"/>
+                            <a:cs typeface="Cambria Math" charset="0"/>
+                          </a:rPr>
+                        </m:ctrlPr>
+                      </m:accPr>
+                      <m:e>
+                        <m:r>
+                          <a:rPr lang="en-US" sz="2800" b="0" i="1" smtClean="0">
+                            <a:latin typeface="Cambria Math" charset="0"/>
+                            <a:ea typeface="Cambria Math" charset="0"/>
+                            <a:cs typeface="Cambria Math" charset="0"/>
+                          </a:rPr>
+                          <m:t>𝑄</m:t>
+                        </m:r>
+                      </m:e>
+                    </m:acc>
+                    <m:r>
+                      <a:rPr lang="en-US" sz="2800" b="0" i="1" smtClean="0">
+                        <a:latin typeface="Cambria Math" charset="0"/>
+                        <a:ea typeface="Cambria Math" charset="0"/>
+                        <a:cs typeface="Cambria Math" charset="0"/>
+                      </a:rPr>
+                      <m:t> </m:t>
+                    </m:r>
+                  </m:oMath>
+                </a14:m>
+                <a:r>
+                  <a:rPr lang="en-US" sz="2800" dirty="0" smtClean="0">
+                    <a:latin typeface="Optima" charset="0"/>
+                    <a:ea typeface="Optima" charset="0"/>
+                    <a:cs typeface="Optima" charset="0"/>
+                  </a:rPr>
+                  <a:t>provides stable values and allows the algorithm to converge to the specified target:</a:t>
                 </a:r>
                 <a:endParaRPr lang="en-US" sz="2800" b="0" i="1" dirty="0" smtClean="0">
                   <a:solidFill>
@@ -5168,17 +5063,6 @@
                 </a14:m>
                 <a:endParaRPr lang="en-US" sz="2800" b="1" u="sng" dirty="0" smtClean="0">
                   <a:solidFill>
-                    <a:schemeClr val="tx1"/>
-                  </a:solidFill>
-                  <a:latin typeface="Optima" charset="0"/>
-                  <a:ea typeface="Optima" charset="0"/>
-                  <a:cs typeface="Optima" charset="0"/>
-                </a:endParaRPr>
-              </a:p>
-              <a:p>
-                <a:pPr algn="just" eaLnBrk="1" hangingPunct="1"/>
-                <a:endParaRPr lang="en-US" sz="2800" b="1" u="sng" dirty="0" smtClean="0">
-                  <a:solidFill>
                     <a:srgbClr val="C00000"/>
                   </a:solidFill>
                   <a:latin typeface="Optima" charset="0"/>
@@ -5197,7 +5081,7 @@
                     <a:ea typeface="Optima" charset="0"/>
                     <a:cs typeface="Optima" charset="0"/>
                   </a:rPr>
-                  <a:t>Double DQN:</a:t>
+                  <a:t>2. Double DQN:</a:t>
                 </a:r>
                 <a:r>
                   <a:rPr lang="en-US" sz="2800" b="1" dirty="0" smtClean="0">
@@ -5210,14 +5094,20 @@
                   </a:rPr>
                   <a:t> </a:t>
                 </a:r>
-                <a:endParaRPr lang="en-US" sz="2800" b="0" i="1" dirty="0" smtClean="0">
-                  <a:solidFill>
-                    <a:srgbClr val="C00000"/>
-                  </a:solidFill>
-                  <a:latin typeface="Cambria Math" charset="0"/>
-                  <a:ea typeface="Optima" charset="0"/>
-                  <a:cs typeface="Optima" charset="0"/>
-                </a:endParaRPr>
+              </a:p>
+              <a:p>
+                <a:pPr marL="457200" indent="-457200" algn="just" eaLnBrk="1" hangingPunct="1">
+                  <a:buFont typeface="Arial" charset="0"/>
+                  <a:buChar char="•"/>
+                </a:pPr>
+                <a:r>
+                  <a:rPr lang="en-US" sz="2800" b="0" dirty="0" smtClean="0">
+                    <a:latin typeface="Optima" charset="0"/>
+                    <a:ea typeface="Optima" charset="0"/>
+                    <a:cs typeface="Optima" charset="0"/>
+                  </a:rPr>
+                  <a:t>Because of the max in the above formula, the action with the highest positive error is selected and this value is subsequently propagated further to other states. This leads to positive bias – value overestimation.</a:t>
+                </a:r>
               </a:p>
               <a:p>
                 <a:pPr algn="ctr" eaLnBrk="1" hangingPunct="1"/>
@@ -5582,7 +5472,7 @@
                 </a14:m>
                 <a:endParaRPr lang="en-US" sz="2800" b="1" u="sng" dirty="0" smtClean="0">
                   <a:solidFill>
-                    <a:schemeClr val="tx1"/>
+                    <a:srgbClr val="C00000"/>
                   </a:solidFill>
                   <a:latin typeface="Optima" charset="0"/>
                   <a:ea typeface="Optima" charset="0"/>
@@ -5590,8 +5480,19 @@
                 </a:endParaRPr>
               </a:p>
               <a:p>
-                <a:pPr algn="just" eaLnBrk="1" hangingPunct="1"/>
-                <a:endParaRPr lang="en-US" sz="2800" b="1" u="sng" dirty="0" smtClean="0">
+                <a:pPr marL="457200" indent="-457200" algn="just" eaLnBrk="1" hangingPunct="1">
+                  <a:buFont typeface="Arial" charset="0"/>
+                  <a:buChar char="•"/>
+                </a:pPr>
+                <a:r>
+                  <a:rPr lang="en-US" sz="2800" dirty="0" smtClean="0">
+                    <a:latin typeface="Optima" charset="0"/>
+                    <a:ea typeface="Optima" charset="0"/>
+                    <a:cs typeface="Optima" charset="0"/>
+                  </a:rPr>
+                  <a:t>Adds stability</a:t>
+                </a:r>
+                <a:endParaRPr lang="en-US" sz="2800" b="1" u="sng" dirty="0">
                   <a:solidFill>
                     <a:srgbClr val="C00000"/>
                   </a:solidFill>
@@ -5601,21 +5502,10 @@
                 </a:endParaRPr>
               </a:p>
               <a:p>
-                <a:pPr algn="just" eaLnBrk="1" hangingPunct="1"/>
-                <a:r>
-                  <a:rPr lang="en-US" sz="2800" b="1" u="sng" dirty="0" smtClean="0">
-                    <a:solidFill>
-                      <a:srgbClr val="C00000"/>
-                    </a:solidFill>
-                    <a:latin typeface="Optima" charset="0"/>
-                    <a:ea typeface="Optima" charset="0"/>
-                    <a:cs typeface="Optima" charset="0"/>
-                  </a:rPr>
-                  <a:t>Double DQN with PER: Equation/ theory</a:t>
-                </a:r>
-              </a:p>
-              <a:p>
-                <a:pPr algn="just" eaLnBrk="1" hangingPunct="1"/>
+                <a:pPr marL="457200" indent="-457200" algn="just" eaLnBrk="1" hangingPunct="1">
+                  <a:buFont typeface="Arial" charset="0"/>
+                  <a:buChar char="•"/>
+                </a:pPr>
                 <a:endParaRPr lang="en-US" sz="2800" b="1" u="sng" dirty="0">
                   <a:solidFill>
                     <a:srgbClr val="C00000"/>
@@ -5636,8 +5526,74 @@
                     <a:ea typeface="Optima" charset="0"/>
                     <a:cs typeface="Optima" charset="0"/>
                   </a:rPr>
-                  <a:t>Dueling DQN: </a:t>
+                  <a:t>3. Dueling DQN: </a:t>
                 </a:r>
+              </a:p>
+              <a:p>
+                <a:pPr marL="457200" indent="-457200" algn="just" eaLnBrk="1" hangingPunct="1">
+                  <a:buFont typeface="Arial" charset="0"/>
+                  <a:buChar char="•"/>
+                </a:pPr>
+                <a:r>
+                  <a:rPr lang="en-US" sz="2800" dirty="0" smtClean="0">
+                    <a:latin typeface="Optima" charset="0"/>
+                    <a:ea typeface="Optima" charset="0"/>
+                    <a:cs typeface="Optima" charset="0"/>
+                  </a:rPr>
+                  <a:t>separate the estimators</a:t>
+                </a:r>
+              </a:p>
+              <a:p>
+                <a:pPr marL="514350" indent="-514350" algn="just" eaLnBrk="1" hangingPunct="1">
+                  <a:buFont typeface="+mj-lt"/>
+                  <a:buAutoNum type="arabicPeriod"/>
+                </a:pPr>
+                <a:r>
+                  <a:rPr lang="en-US" sz="2800" dirty="0" smtClean="0">
+                    <a:latin typeface="Optima" charset="0"/>
+                    <a:ea typeface="Optima" charset="0"/>
+                    <a:cs typeface="Optima" charset="0"/>
+                  </a:rPr>
+                  <a:t>one that estimates the state value V(s)</a:t>
+                </a:r>
+              </a:p>
+              <a:p>
+                <a:pPr marL="514350" indent="-514350" algn="just" eaLnBrk="1" hangingPunct="1">
+                  <a:buFont typeface="+mj-lt"/>
+                  <a:buAutoNum type="arabicPeriod"/>
+                </a:pPr>
+                <a:r>
+                  <a:rPr lang="en-US" sz="2800" dirty="0" smtClean="0">
+                    <a:latin typeface="Optima" charset="0"/>
+                    <a:ea typeface="Optima" charset="0"/>
+                    <a:cs typeface="Optima" charset="0"/>
+                  </a:rPr>
+                  <a:t>one that estimates the advantage for each action A(</a:t>
+                </a:r>
+                <a:r>
+                  <a:rPr lang="en-US" sz="2800" dirty="0" err="1" smtClean="0">
+                    <a:latin typeface="Optima" charset="0"/>
+                    <a:ea typeface="Optima" charset="0"/>
+                    <a:cs typeface="Optima" charset="0"/>
+                  </a:rPr>
+                  <a:t>s,a</a:t>
+                </a:r>
+                <a:r>
+                  <a:rPr lang="en-US" sz="2800" dirty="0" smtClean="0">
+                    <a:latin typeface="Optima" charset="0"/>
+                    <a:ea typeface="Optima" charset="0"/>
+                    <a:cs typeface="Optima" charset="0"/>
+                  </a:rPr>
+                  <a:t>)</a:t>
+                </a:r>
+                <a:endParaRPr lang="en-US" sz="2800" b="1" u="sng" dirty="0" smtClean="0">
+                  <a:solidFill>
+                    <a:srgbClr val="C00000"/>
+                  </a:solidFill>
+                  <a:latin typeface="Optima" charset="0"/>
+                  <a:ea typeface="Optima" charset="0"/>
+                  <a:cs typeface="Optima" charset="0"/>
+                </a:endParaRPr>
               </a:p>
               <a:p>
                 <a:pPr algn="just" eaLnBrk="1" hangingPunct="1"/>
@@ -6454,6 +6410,45 @@
               </a:p>
               <a:p>
                 <a:pPr algn="just" eaLnBrk="1" hangingPunct="1"/>
+                <a:r>
+                  <a:rPr lang="en-US" sz="2800" b="1" u="sng" dirty="0" smtClean="0">
+                    <a:solidFill>
+                      <a:srgbClr val="C00000"/>
+                    </a:solidFill>
+                    <a:latin typeface="Optima" charset="0"/>
+                    <a:ea typeface="Optima" charset="0"/>
+                    <a:cs typeface="Optima" charset="0"/>
+                  </a:rPr>
+                  <a:t>(add more)?)</a:t>
+                </a:r>
+              </a:p>
+              <a:p>
+                <a:pPr algn="just" eaLnBrk="1" hangingPunct="1"/>
+                <a:r>
+                  <a:rPr lang="en-US" sz="2800" b="1" u="sng" dirty="0" smtClean="0">
+                    <a:solidFill>
+                      <a:srgbClr val="C00000"/>
+                    </a:solidFill>
+                    <a:latin typeface="Optima" charset="0"/>
+                    <a:ea typeface="Optima" charset="0"/>
+                    <a:cs typeface="Optima" charset="0"/>
+                  </a:rPr>
+                  <a:t>Neural Network</a:t>
+                </a:r>
+              </a:p>
+              <a:p>
+                <a:pPr marL="457200" indent="-457200" algn="just" eaLnBrk="1" hangingPunct="1">
+                  <a:buFontTx/>
+                  <a:buChar char="-"/>
+                </a:pPr>
+                <a:endParaRPr lang="en-US" sz="2800" dirty="0">
+                  <a:latin typeface="Optima" charset="0"/>
+                  <a:ea typeface="Optima" charset="0"/>
+                  <a:cs typeface="Optima" charset="0"/>
+                </a:endParaRPr>
+              </a:p>
+              <a:p>
+                <a:pPr algn="just" eaLnBrk="1" hangingPunct="1"/>
                 <a:endParaRPr lang="en-US" sz="2800" b="1" u="sng" dirty="0" smtClean="0">
                   <a:solidFill>
                     <a:srgbClr val="C00000"/>
@@ -6577,7 +6572,7 @@
             <p:spPr bwMode="auto">
               <a:xfrm>
                 <a:off x="10747019" y="3363308"/>
-                <a:ext cx="10510811" cy="12431032"/>
+                <a:ext cx="10510811" cy="17173804"/>
               </a:xfrm>
               <a:prstGeom prst="rect">
                 <a:avLst/>
@@ -6808,7 +6803,7 @@
         <p:spPr>
           <a:xfrm>
             <a:off x="181289" y="6649809"/>
-            <a:ext cx="10463049" cy="14619387"/>
+            <a:ext cx="10442043" cy="14619387"/>
           </a:xfrm>
           <a:prstGeom prst="rect">
             <a:avLst/>
@@ -7200,7 +7195,7 @@
         <p:spPr>
           <a:xfrm>
             <a:off x="260102" y="7243140"/>
-            <a:ext cx="4687724" cy="6555641"/>
+            <a:ext cx="4687724" cy="7417415"/>
           </a:xfrm>
           <a:prstGeom prst="rect">
             <a:avLst/>
@@ -7213,14 +7208,17 @@
           </a:bodyPr>
           <a:lstStyle/>
           <a:p>
-            <a:pPr algn="just"/>
+            <a:pPr marL="457200" indent="-457200" algn="just">
+              <a:buFont typeface="Arial" charset="0"/>
+              <a:buChar char="•"/>
+            </a:pPr>
             <a:r>
               <a:rPr lang="en-US" sz="2800" dirty="0" smtClean="0">
                 <a:latin typeface="Optima" charset="0"/>
                 <a:ea typeface="Optima" charset="0"/>
                 <a:cs typeface="Optima" charset="0"/>
               </a:rPr>
-              <a:t>To build </a:t>
+              <a:t>AI agents need to safely </a:t>
             </a:r>
             <a:r>
               <a:rPr lang="en-US" sz="2800" dirty="0">
@@ -7228,7 +7226,7 @@
                 <a:ea typeface="Optima" charset="0"/>
                 <a:cs typeface="Optima" charset="0"/>
               </a:rPr>
-              <a:t>an AI agent to play Lunar Lander game to safely land on a landing </a:t>
+              <a:t>land on a landing </a:t>
             </a:r>
             <a:r>
               <a:rPr lang="en-US" sz="2800" dirty="0" smtClean="0">
@@ -7236,7 +7234,21 @@
                 <a:ea typeface="Optima" charset="0"/>
                 <a:cs typeface="Optima" charset="0"/>
               </a:rPr>
-              <a:t>pad. Landing </a:t>
+              <a:t>pad.</a:t>
+            </a:r>
+          </a:p>
+          <a:p>
+            <a:pPr marL="457200" indent="-457200" algn="just">
+              <a:buFont typeface="Arial" charset="0"/>
+              <a:buChar char="•"/>
+            </a:pPr>
+            <a:r>
+              <a:rPr lang="en-US" sz="2800" dirty="0" smtClean="0">
+                <a:latin typeface="Optima" charset="0"/>
+                <a:ea typeface="Optima" charset="0"/>
+                <a:cs typeface="Optima" charset="0"/>
+              </a:rPr>
+              <a:t>Landing </a:t>
             </a:r>
             <a:r>
               <a:rPr lang="en-US" sz="2800" dirty="0">
@@ -7244,7 +7256,29 @@
                 <a:ea typeface="Optima" charset="0"/>
                 <a:cs typeface="Optima" charset="0"/>
               </a:rPr>
-              <a:t>pad is always at coordinates (0,0). Reward for reaching the landing pad is about 100 to 140 points, depending on the </a:t>
+              <a:t>pad is always at coordinates (0,0). </a:t>
+            </a:r>
+          </a:p>
+          <a:p>
+            <a:pPr marL="457200" indent="-457200" algn="just">
+              <a:buFont typeface="Arial" charset="0"/>
+              <a:buChar char="•"/>
+            </a:pPr>
+            <a:r>
+              <a:rPr lang="en-US" sz="2800" dirty="0" smtClean="0">
+                <a:latin typeface="Optima" charset="0"/>
+                <a:ea typeface="Optima" charset="0"/>
+                <a:cs typeface="Optima" charset="0"/>
+              </a:rPr>
+              <a:t>Reward </a:t>
+            </a:r>
+            <a:r>
+              <a:rPr lang="en-US" sz="2800" dirty="0">
+                <a:latin typeface="Optima" charset="0"/>
+                <a:ea typeface="Optima" charset="0"/>
+                <a:cs typeface="Optima" charset="0"/>
+              </a:rPr>
+              <a:t>for reaching the landing pad is about 100 to 140 points, depending on the </a:t>
             </a:r>
             <a:r>
               <a:rPr lang="en-US" sz="2800" dirty="0" smtClean="0">
@@ -7254,13 +7288,54 @@
               </a:rPr>
               <a:t>speed. </a:t>
             </a:r>
+          </a:p>
+          <a:p>
+            <a:pPr marL="457200" indent="-457200" algn="just">
+              <a:buFont typeface="Arial" charset="0"/>
+              <a:buChar char="•"/>
+            </a:pPr>
+            <a:r>
+              <a:rPr lang="en-US" sz="2800" dirty="0" smtClean="0">
+                <a:latin typeface="Optima" charset="0"/>
+                <a:ea typeface="Optima" charset="0"/>
+                <a:cs typeface="Optima" charset="0"/>
+              </a:rPr>
+              <a:t>Episode </a:t>
+            </a:r>
             <a:r>
               <a:rPr lang="en-US" sz="2800" dirty="0">
                 <a:latin typeface="Optima" charset="0"/>
                 <a:ea typeface="Optima" charset="0"/>
                 <a:cs typeface="Optima" charset="0"/>
               </a:rPr>
-              <a:t>Episode finishes if the lander crashes or comes to rest, receiving additional -100 or +100 points. Each leg ground contact is +10. Firing main engine is -0.3 points each frame. Solved is 200 points</a:t>
+              <a:t>finishes if the lander crashes or comes to rest, receiving additional -100 or +100 points. </a:t>
+            </a:r>
+            <a:endParaRPr lang="en-US" sz="2800" dirty="0" smtClean="0">
+              <a:latin typeface="Optima" charset="0"/>
+              <a:ea typeface="Optima" charset="0"/>
+              <a:cs typeface="Optima" charset="0"/>
+            </a:endParaRPr>
+          </a:p>
+          <a:p>
+            <a:pPr marL="457200" indent="-457200" algn="just">
+              <a:buFont typeface="Arial" charset="0"/>
+              <a:buChar char="•"/>
+            </a:pPr>
+            <a:r>
+              <a:rPr lang="en-US" sz="2800" dirty="0" smtClean="0">
+                <a:latin typeface="Optima" charset="0"/>
+                <a:ea typeface="Optima" charset="0"/>
+                <a:cs typeface="Optima" charset="0"/>
+              </a:rPr>
+              <a:t>Each </a:t>
+            </a:r>
+            <a:r>
+              <a:rPr lang="en-US" sz="2800" dirty="0">
+                <a:latin typeface="Optima" charset="0"/>
+                <a:ea typeface="Optima" charset="0"/>
+                <a:cs typeface="Optima" charset="0"/>
+              </a:rPr>
+              <a:t>leg ground contact is +10. Firing main engine is -0.3 points each frame. Solved is 200 points</a:t>
             </a:r>
             <a:r>
               <a:rPr lang="en-US" sz="2800" dirty="0" smtClean="0">
@@ -7281,8 +7356,8 @@
         </p:nvSpPr>
         <p:spPr>
           <a:xfrm>
-            <a:off x="260102" y="14424690"/>
-            <a:ext cx="10294693" cy="5447645"/>
+            <a:off x="260102" y="14570664"/>
+            <a:ext cx="10294693" cy="5262979"/>
           </a:xfrm>
           <a:prstGeom prst="rect">
             <a:avLst/>
@@ -7338,53 +7413,80 @@
               <a:defRPr/>
             </a:pPr>
             <a:r>
+              <a:rPr lang="en-US" sz="2800" dirty="0" smtClean="0">
+                <a:latin typeface="Optima" charset="0"/>
+                <a:ea typeface="Optima" charset="0"/>
+                <a:cs typeface="Optima" charset="0"/>
+              </a:rPr>
+              <a:t>Performance of an algorithm for </a:t>
+            </a:r>
+            <a:r>
               <a:rPr lang="en-US" sz="2800" dirty="0">
                 <a:latin typeface="Optima" charset="0"/>
                 <a:ea typeface="Optima" charset="0"/>
                 <a:cs typeface="Optima" charset="0"/>
               </a:rPr>
-              <a:t>Task Calculate performance of the agent by metrics</a:t>
-            </a:r>
-          </a:p>
-          <a:p>
-            <a:pPr algn="just" defTabSz="3134577" eaLnBrk="1" hangingPunct="1">
+              <a:t>the </a:t>
+            </a:r>
+            <a:r>
+              <a:rPr lang="en-US" sz="2800" dirty="0" smtClean="0">
+                <a:latin typeface="Optima" charset="0"/>
+                <a:ea typeface="Optima" charset="0"/>
+                <a:cs typeface="Optima" charset="0"/>
+              </a:rPr>
+              <a:t>agent is based on</a:t>
+            </a:r>
+            <a:endParaRPr lang="en-US" sz="2800" dirty="0">
+              <a:latin typeface="Optima" charset="0"/>
+              <a:ea typeface="Optima" charset="0"/>
+              <a:cs typeface="Optima" charset="0"/>
+            </a:endParaRPr>
+          </a:p>
+          <a:p>
+            <a:pPr marL="457200" indent="-457200" algn="just" defTabSz="3134577" eaLnBrk="1" hangingPunct="1">
+              <a:buFontTx/>
+              <a:buChar char="-"/>
               <a:defRPr/>
             </a:pPr>
+            <a:r>
+              <a:rPr lang="en-US" sz="2800" dirty="0" smtClean="0">
+                <a:latin typeface="Optima" charset="0"/>
+                <a:ea typeface="Optima" charset="0"/>
+                <a:cs typeface="Optima" charset="0"/>
+              </a:rPr>
+              <a:t>Number </a:t>
+            </a:r>
             <a:r>
               <a:rPr lang="en-US" sz="2800" dirty="0">
                 <a:latin typeface="Optima" charset="0"/>
                 <a:ea typeface="Optima" charset="0"/>
                 <a:cs typeface="Optima" charset="0"/>
               </a:rPr>
-              <a:t>- </a:t>
-            </a:r>
-            <a:r>
-              <a:rPr lang="en-US" sz="2800" dirty="0" err="1">
+              <a:t>of </a:t>
+            </a:r>
+            <a:r>
+              <a:rPr lang="en-US" sz="2800" dirty="0" smtClean="0">
                 <a:latin typeface="Optima" charset="0"/>
                 <a:ea typeface="Optima" charset="0"/>
                 <a:cs typeface="Optima" charset="0"/>
               </a:rPr>
-              <a:t>Avg</a:t>
-            </a:r>
-            <a:r>
-              <a:rPr lang="en-US" sz="2800" dirty="0">
+              <a:t>episodes taken to achieve average rewards of 200 points.</a:t>
+            </a:r>
+          </a:p>
+          <a:p>
+            <a:pPr marL="457200" indent="-457200" algn="just" defTabSz="3134577" eaLnBrk="1" hangingPunct="1">
+              <a:buFontTx/>
+              <a:buChar char="-"/>
+              <a:defRPr/>
+            </a:pPr>
+            <a:r>
+              <a:rPr lang="en-US" sz="2800" dirty="0" smtClean="0">
                 <a:latin typeface="Optima" charset="0"/>
                 <a:ea typeface="Optima" charset="0"/>
                 <a:cs typeface="Optima" charset="0"/>
               </a:rPr>
-              <a:t> rewards vs number of episodes</a:t>
-            </a:r>
-          </a:p>
-          <a:p>
-            <a:pPr algn="just"/>
-            <a:endParaRPr lang="en-US" sz="2800" dirty="0" smtClean="0">
-              <a:latin typeface="Optima" charset="0"/>
-              <a:ea typeface="Optima" charset="0"/>
-              <a:cs typeface="Optima" charset="0"/>
-            </a:endParaRPr>
-          </a:p>
-          <a:p>
-            <a:pPr algn="just"/>
+              <a:t>Least Space and Time Complexity.</a:t>
+            </a:r>
             <a:endParaRPr lang="en-US" sz="2800" dirty="0" smtClean="0">
               <a:latin typeface="Optima" charset="0"/>
               <a:ea typeface="Optima" charset="0"/>
@@ -7408,7 +7510,7 @@
         <p:spPr bwMode="auto">
           <a:xfrm>
             <a:off x="21413048" y="3363308"/>
-            <a:ext cx="11353800" cy="10926068"/>
+            <a:ext cx="11353800" cy="12649617"/>
           </a:xfrm>
           <a:prstGeom prst="rect">
             <a:avLst/>
@@ -7500,14 +7602,112 @@
               <a:buFontTx/>
               <a:buChar char="-"/>
             </a:pPr>
-            <a:endParaRPr lang="en-US" sz="2800" b="1" u="sng" dirty="0" smtClean="0">
-              <a:solidFill>
-                <a:srgbClr val="C00000"/>
-              </a:solidFill>
-              <a:latin typeface="Optima" charset="0"/>
-              <a:ea typeface="Optima" charset="0"/>
-              <a:cs typeface="Optima" charset="0"/>
-            </a:endParaRPr>
+            <a:r>
+              <a:rPr lang="en-US" sz="2800" dirty="0" smtClean="0">
+                <a:solidFill>
+                  <a:srgbClr val="C00000"/>
+                </a:solidFill>
+                <a:latin typeface="Optima" charset="0"/>
+                <a:ea typeface="Optima" charset="0"/>
+                <a:cs typeface="Optima" charset="0"/>
+              </a:rPr>
+              <a:t>Max scores for each model (comment on the top score)</a:t>
+            </a:r>
+          </a:p>
+          <a:p>
+            <a:pPr marL="457200" indent="-457200" algn="just" eaLnBrk="1" hangingPunct="1">
+              <a:buFontTx/>
+              <a:buChar char="-"/>
+            </a:pPr>
+            <a:r>
+              <a:rPr lang="en-US" sz="2800" dirty="0" smtClean="0">
+                <a:solidFill>
+                  <a:srgbClr val="C00000"/>
+                </a:solidFill>
+                <a:latin typeface="Optima" charset="0"/>
+                <a:ea typeface="Optima" charset="0"/>
+                <a:cs typeface="Optima" charset="0"/>
+              </a:rPr>
+              <a:t>Comment on steepness of the learning.</a:t>
+            </a:r>
+          </a:p>
+          <a:p>
+            <a:pPr marL="457200" indent="-457200" algn="just" eaLnBrk="1" hangingPunct="1">
+              <a:buFontTx/>
+              <a:buChar char="-"/>
+            </a:pPr>
+            <a:r>
+              <a:rPr lang="en-US" sz="2800" b="1" u="sng" dirty="0" smtClean="0">
+                <a:solidFill>
+                  <a:srgbClr val="C00000"/>
+                </a:solidFill>
+                <a:latin typeface="Optima" charset="0"/>
+                <a:ea typeface="Optima" charset="0"/>
+                <a:cs typeface="Optima" charset="0"/>
+              </a:rPr>
+              <a:t>Better than baseline? Reaches oracle?</a:t>
+            </a:r>
+          </a:p>
+          <a:p>
+            <a:pPr marL="457200" indent="-457200" algn="just" eaLnBrk="1" hangingPunct="1">
+              <a:buFontTx/>
+              <a:buChar char="-"/>
+            </a:pPr>
+            <a:r>
+              <a:rPr lang="en-US" sz="2800" b="1" u="sng" dirty="0" smtClean="0">
+                <a:solidFill>
+                  <a:srgbClr val="C00000"/>
+                </a:solidFill>
+                <a:latin typeface="Optima" charset="0"/>
+                <a:ea typeface="Optima" charset="0"/>
+                <a:cs typeface="Optima" charset="0"/>
+              </a:rPr>
+              <a:t>Observation on how and why the models have different </a:t>
+            </a:r>
+            <a:r>
+              <a:rPr lang="en-US" sz="2800" b="1" u="sng" dirty="0" err="1" smtClean="0">
+                <a:solidFill>
+                  <a:srgbClr val="C00000"/>
+                </a:solidFill>
+                <a:latin typeface="Optima" charset="0"/>
+                <a:ea typeface="Optima" charset="0"/>
+                <a:cs typeface="Optima" charset="0"/>
+              </a:rPr>
+              <a:t>behaviours</a:t>
+            </a:r>
+            <a:r>
+              <a:rPr lang="en-US" sz="2800" b="1" u="sng" dirty="0" smtClean="0">
+                <a:solidFill>
+                  <a:srgbClr val="C00000"/>
+                </a:solidFill>
+                <a:latin typeface="Optima" charset="0"/>
+                <a:ea typeface="Optima" charset="0"/>
+                <a:cs typeface="Optima" charset="0"/>
+              </a:rPr>
+              <a:t>? (</a:t>
+            </a:r>
+            <a:r>
+              <a:rPr lang="en-US" sz="2800" b="1" u="sng" dirty="0" err="1" smtClean="0">
+                <a:solidFill>
+                  <a:srgbClr val="C00000"/>
+                </a:solidFill>
+                <a:latin typeface="Optima" charset="0"/>
+                <a:ea typeface="Optima" charset="0"/>
+                <a:cs typeface="Optima" charset="0"/>
+              </a:rPr>
+              <a:t>psr</a:t>
+            </a:r>
+            <a:r>
+              <a:rPr lang="en-US" sz="2800" b="1" u="sng" dirty="0" smtClean="0">
+                <a:solidFill>
+                  <a:srgbClr val="C00000"/>
+                </a:solidFill>
+                <a:latin typeface="Optima" charset="0"/>
+                <a:ea typeface="Optima" charset="0"/>
+                <a:cs typeface="Optima" charset="0"/>
+              </a:rPr>
+              <a:t>?)</a:t>
+            </a:r>
           </a:p>
           <a:p>
             <a:pPr marL="457200" indent="-457200" algn="just" eaLnBrk="1" hangingPunct="1">
@@ -7756,7 +7956,7 @@
         <p:spPr bwMode="auto">
           <a:xfrm>
             <a:off x="21394924" y="14334769"/>
-            <a:ext cx="11353800" cy="3600986"/>
+            <a:ext cx="11353800" cy="4031873"/>
           </a:xfrm>
           <a:prstGeom prst="rect">
             <a:avLst/>
@@ -7809,69 +8009,109 @@
           </a:p>
           <a:p>
             <a:pPr algn="just" eaLnBrk="1" hangingPunct="1"/>
-            <a:endParaRPr lang="en-US" sz="2800" b="1" u="sng" dirty="0">
-              <a:solidFill>
-                <a:srgbClr val="C00000"/>
-              </a:solidFill>
-              <a:latin typeface="Optima" charset="0"/>
-              <a:ea typeface="Optima" charset="0"/>
-              <a:cs typeface="Optima" charset="0"/>
-            </a:endParaRPr>
-          </a:p>
-          <a:p>
-            <a:pPr algn="just" eaLnBrk="1" hangingPunct="1"/>
-            <a:endParaRPr lang="en-US" sz="2800" b="1" u="sng" dirty="0" smtClean="0">
-              <a:solidFill>
-                <a:srgbClr val="C00000"/>
-              </a:solidFill>
-              <a:latin typeface="Optima" charset="0"/>
-              <a:ea typeface="Optima" charset="0"/>
-              <a:cs typeface="Optima" charset="0"/>
-            </a:endParaRPr>
-          </a:p>
-          <a:p>
-            <a:pPr algn="just" eaLnBrk="1" hangingPunct="1"/>
-            <a:endParaRPr lang="en-US" sz="2800" b="1" u="sng" dirty="0">
-              <a:solidFill>
-                <a:srgbClr val="C00000"/>
-              </a:solidFill>
-              <a:latin typeface="Optima" charset="0"/>
-              <a:ea typeface="Optima" charset="0"/>
-              <a:cs typeface="Optima" charset="0"/>
-            </a:endParaRPr>
-          </a:p>
-          <a:p>
-            <a:pPr algn="just" eaLnBrk="1" hangingPunct="1"/>
-            <a:endParaRPr lang="en-US" sz="2800" b="1" u="sng" dirty="0" smtClean="0">
-              <a:solidFill>
-                <a:srgbClr val="C00000"/>
-              </a:solidFill>
-              <a:latin typeface="Optima" charset="0"/>
-              <a:ea typeface="Optima" charset="0"/>
-              <a:cs typeface="Optima" charset="0"/>
-            </a:endParaRPr>
-          </a:p>
-          <a:p>
-            <a:pPr algn="just" eaLnBrk="1" hangingPunct="1"/>
-            <a:endParaRPr lang="en-US" sz="2800" b="1" u="sng" dirty="0">
-              <a:solidFill>
-                <a:srgbClr val="C00000"/>
-              </a:solidFill>
-              <a:latin typeface="Optima" charset="0"/>
-              <a:ea typeface="Optima" charset="0"/>
-              <a:cs typeface="Optima" charset="0"/>
-            </a:endParaRPr>
-          </a:p>
-          <a:p>
-            <a:pPr algn="just" eaLnBrk="1" hangingPunct="1"/>
-            <a:endParaRPr lang="en-US" sz="2800" b="1" u="sng" dirty="0" smtClean="0">
-              <a:solidFill>
-                <a:srgbClr val="C00000"/>
-              </a:solidFill>
-              <a:latin typeface="Optima" charset="0"/>
-              <a:ea typeface="Optima" charset="0"/>
-              <a:cs typeface="Optima" charset="0"/>
-            </a:endParaRPr>
+            <a:r>
+              <a:rPr lang="en-US" sz="2800" dirty="0" smtClean="0">
+                <a:latin typeface="Optima" charset="0"/>
+                <a:ea typeface="Optima" charset="0"/>
+                <a:cs typeface="Optima" charset="0"/>
+              </a:rPr>
+              <a:t>- Currently our algorithm takes </a:t>
+            </a:r>
+            <a:r>
+              <a:rPr lang="en-US" sz="2800" dirty="0" smtClean="0">
+                <a:solidFill>
+                  <a:srgbClr val="FF0000"/>
+                </a:solidFill>
+                <a:latin typeface="Optima" charset="0"/>
+                <a:ea typeface="Optima" charset="0"/>
+                <a:cs typeface="Optima" charset="0"/>
+              </a:rPr>
+              <a:t>???? </a:t>
+            </a:r>
+            <a:r>
+              <a:rPr lang="en-US" sz="2800" dirty="0" smtClean="0">
+                <a:latin typeface="Optima" charset="0"/>
+                <a:ea typeface="Optima" charset="0"/>
+                <a:cs typeface="Optima" charset="0"/>
+              </a:rPr>
+              <a:t>Episodes to learn and consistently win the game. We plan to try </a:t>
+            </a:r>
+            <a:r>
+              <a:rPr lang="en-US" sz="2800" dirty="0">
+                <a:latin typeface="Optima" charset="0"/>
+                <a:ea typeface="Optima" charset="0"/>
+                <a:cs typeface="Optima" charset="0"/>
+              </a:rPr>
+              <a:t>P</a:t>
+            </a:r>
+            <a:r>
+              <a:rPr lang="en-US" sz="2800" dirty="0" smtClean="0">
+                <a:latin typeface="Optima" charset="0"/>
+                <a:ea typeface="Optima" charset="0"/>
+                <a:cs typeface="Optima" charset="0"/>
+              </a:rPr>
+              <a:t>rioritized </a:t>
+            </a:r>
+            <a:r>
+              <a:rPr lang="en-US" sz="2800" dirty="0">
+                <a:latin typeface="Optima" charset="0"/>
+                <a:ea typeface="Optima" charset="0"/>
+                <a:cs typeface="Optima" charset="0"/>
+              </a:rPr>
+              <a:t>E</a:t>
+            </a:r>
+            <a:r>
+              <a:rPr lang="en-US" sz="2800" dirty="0" smtClean="0">
+                <a:latin typeface="Optima" charset="0"/>
+                <a:ea typeface="Optima" charset="0"/>
+                <a:cs typeface="Optima" charset="0"/>
+              </a:rPr>
+              <a:t>xperience Replay and A3C algorithm to  improve the DQN convergence speed. </a:t>
+            </a:r>
+          </a:p>
+          <a:p>
+            <a:pPr marL="457200" indent="-457200" algn="just" eaLnBrk="1" hangingPunct="1">
+              <a:buFontTx/>
+              <a:buChar char="-"/>
+            </a:pPr>
+            <a:r>
+              <a:rPr lang="en-US" sz="2800" dirty="0" smtClean="0">
+                <a:latin typeface="Optima" charset="0"/>
+                <a:ea typeface="Optima" charset="0"/>
+                <a:cs typeface="Optima" charset="0"/>
+              </a:rPr>
+              <a:t>We also plan to reduce the replay memory size requirement and DNN layer size to overall reduce the Space Complexity of the algorithm without compromising the performance.</a:t>
+            </a:r>
+          </a:p>
+          <a:p>
+            <a:pPr marL="457200" indent="-457200" algn="just" eaLnBrk="1" hangingPunct="1">
+              <a:buFontTx/>
+              <a:buChar char="-"/>
+            </a:pPr>
+            <a:r>
+              <a:rPr lang="en-US" sz="2800" dirty="0" smtClean="0">
+                <a:latin typeface="Optima" charset="0"/>
+                <a:ea typeface="Optima" charset="0"/>
+                <a:cs typeface="Optima" charset="0"/>
+              </a:rPr>
+              <a:t>conduct more extensive </a:t>
+            </a:r>
+            <a:r>
+              <a:rPr lang="en-US" sz="2800" dirty="0" err="1" smtClean="0">
+                <a:latin typeface="Optima" charset="0"/>
+                <a:ea typeface="Optima" charset="0"/>
+                <a:cs typeface="Optima" charset="0"/>
+              </a:rPr>
+              <a:t>hyperparameter</a:t>
+            </a:r>
+            <a:r>
+              <a:rPr lang="en-US" sz="2800" dirty="0" smtClean="0">
+                <a:latin typeface="Optima" charset="0"/>
+                <a:ea typeface="Optima" charset="0"/>
+                <a:cs typeface="Optima" charset="0"/>
+              </a:rPr>
+              <a:t> tuning.</a:t>
+            </a:r>
           </a:p>
           <a:p>
             <a:pPr algn="just" eaLnBrk="1" hangingPunct="1"/>
@@ -7929,7 +8169,7 @@
           <a:p>
             <a:pPr eaLnBrk="1" hangingPunct="1"/>
             <a:r>
-              <a:rPr lang="en-US" sz="3200" b="1" u="sng" smtClean="0">
+              <a:rPr lang="en-US" sz="3200" b="1" u="sng" dirty="0" smtClean="0">
                 <a:solidFill>
                   <a:srgbClr val="C00000"/>
                 </a:solidFill>
@@ -8038,14 +8278,691 @@
         </p:blipFill>
         <p:spPr>
           <a:xfrm>
-            <a:off x="5029501" y="10533584"/>
-            <a:ext cx="5593831" cy="3534366"/>
+            <a:off x="4958023" y="10533583"/>
+            <a:ext cx="5744122" cy="3579529"/>
           </a:xfrm>
           <a:prstGeom prst="rect">
             <a:avLst/>
           </a:prstGeom>
         </p:spPr>
       </p:pic>
+      <p:sp>
+        <p:nvSpPr>
+          <p:cNvPr id="81" name="Rectangle 70"/>
+          <p:cNvSpPr>
+            <a:spLocks noChangeArrowheads="1"/>
+          </p:cNvSpPr>
+          <p:nvPr/>
+        </p:nvSpPr>
+        <p:spPr bwMode="auto">
+          <a:xfrm>
+            <a:off x="0" y="-286925"/>
+            <a:ext cx="184731" cy="1031051"/>
+          </a:xfrm>
+          <a:prstGeom prst="rect">
+            <a:avLst/>
+          </a:prstGeom>
+          <a:solidFill>
+            <a:srgbClr val="FFFFFF"/>
+          </a:solidFill>
+          <a:ln>
+            <a:noFill/>
+          </a:ln>
+          <a:effectLst/>
+          <a:extLst>
+            <a:ext uri="{91240B29-F687-4F45-9708-019B960494DF}">
+              <a14:hiddenLine xmlns:a14="http://schemas.microsoft.com/office/drawing/2010/main" w="9525">
+                <a:solidFill>
+                  <a:schemeClr val="tx1"/>
+                </a:solidFill>
+                <a:miter lim="800000"/>
+                <a:headEnd/>
+                <a:tailEnd/>
+              </a14:hiddenLine>
+            </a:ext>
+            <a:ext uri="{AF507438-7753-43E0-B8FC-AC1667EBCBE1}">
+              <a14:hiddenEffects xmlns:a14="http://schemas.microsoft.com/office/drawing/2010/main">
+                <a:effectLst>
+                  <a:outerShdw blurRad="63500" dist="38099" dir="2700000" algn="ctr" rotWithShape="0">
+                    <a:schemeClr val="bg2">
+                      <a:alpha val="74998"/>
+                    </a:schemeClr>
+                  </a:outerShdw>
+                </a:effectLst>
+              </a14:hiddenEffects>
+            </a:ext>
+          </a:extLst>
+        </p:spPr>
+        <p:txBody>
+          <a:bodyPr vert="horz" wrap="none" lIns="91440" tIns="45720" rIns="91440" bIns="45720" numCol="1" anchor="ctr" anchorCtr="0" compatLnSpc="1">
+            <a:prstTxWarp prst="textNoShape">
+              <a:avLst/>
+            </a:prstTxWarp>
+            <a:spAutoFit/>
+          </a:bodyPr>
+          <a:lstStyle/>
+          <a:p>
+            <a:pPr marL="0" marR="0" lvl="0" indent="0" algn="l" defTabSz="3133725" rtl="0" eaLnBrk="0" fontAlgn="base" latinLnBrk="0" hangingPunct="0">
+              <a:lnSpc>
+                <a:spcPct val="100000"/>
+              </a:lnSpc>
+              <a:spcBef>
+                <a:spcPct val="0"/>
+              </a:spcBef>
+              <a:spcAft>
+                <a:spcPct val="0"/>
+              </a:spcAft>
+              <a:buClrTx/>
+              <a:buSzTx/>
+              <a:buFontTx/>
+              <a:buNone/>
+              <a:tabLst/>
+            </a:pPr>
+            <a:endParaRPr kumimoji="0" lang="en-US" altLang="en-US" sz="6100" b="0" i="0" u="none" strike="noStrike" cap="none" normalizeH="0" baseline="0" dirty="0">
+              <a:ln>
+                <a:noFill/>
+              </a:ln>
+              <a:solidFill>
+                <a:schemeClr val="tx1"/>
+              </a:solidFill>
+              <a:effectLst/>
+              <a:latin typeface="Calibri" charset="0"/>
+              <a:ea typeface="Arial" charset="0"/>
+              <a:cs typeface="Arial" charset="0"/>
+            </a:endParaRPr>
+          </a:p>
+        </p:txBody>
+      </p:sp>
+      <p:pic>
+        <p:nvPicPr>
+          <p:cNvPr id="13383" name="Picture 71" descr="tilde{Q}"/>
+          <p:cNvPicPr>
+            <a:picLocks noChangeAspect="1" noChangeArrowheads="1"/>
+          </p:cNvPicPr>
+          <p:nvPr/>
+        </p:nvPicPr>
+        <p:blipFill>
+          <a:blip r:embed="rId7">
+            <a:extLst>
+              <a:ext uri="{28A0092B-C50C-407E-A947-70E740481C1C}">
+                <a14:useLocalDpi xmlns:a14="http://schemas.microsoft.com/office/drawing/2010/main" val="0"/>
+              </a:ext>
+            </a:extLst>
+          </a:blip>
+          <a:srcRect/>
+          <a:stretch>
+            <a:fillRect/>
+          </a:stretch>
+        </p:blipFill>
+        <p:spPr bwMode="auto">
+          <a:xfrm>
+            <a:off x="0" y="0"/>
+            <a:ext cx="123825" cy="180975"/>
+          </a:xfrm>
+          <a:prstGeom prst="rect">
+            <a:avLst/>
+          </a:prstGeom>
+          <a:noFill/>
+          <a:extLst>
+            <a:ext uri="{909E8E84-426E-40DD-AFC4-6F175D3DCCD1}">
+              <a14:hiddenFill xmlns:a14="http://schemas.microsoft.com/office/drawing/2010/main">
+                <a:solidFill>
+                  <a:srgbClr val="FFFFFF"/>
+                </a:solidFill>
+              </a14:hiddenFill>
+            </a:ext>
+          </a:extLst>
+        </p:spPr>
+      </p:pic>
+      <p:graphicFrame>
+        <p:nvGraphicFramePr>
+          <p:cNvPr id="90" name="Content Placeholder 5"/>
+          <p:cNvGraphicFramePr>
+            <a:graphicFrameLocks/>
+          </p:cNvGraphicFramePr>
+          <p:nvPr>
+            <p:extLst>
+              <p:ext uri="{D42A27DB-BD31-4B8C-83A1-F6EECF244321}">
+                <p14:modId xmlns:p14="http://schemas.microsoft.com/office/powerpoint/2010/main" val="751330486"/>
+              </p:ext>
+            </p:extLst>
+          </p:nvPr>
+        </p:nvGraphicFramePr>
+        <p:xfrm>
+          <a:off x="11172111" y="16305075"/>
+          <a:ext cx="9707562" cy="3048000"/>
+        </p:xfrm>
+        <a:graphic>
+          <a:graphicData uri="http://schemas.openxmlformats.org/drawingml/2006/table">
+            <a:tbl>
+              <a:tblPr firstRow="1" bandRow="1">
+                <a:tableStyleId>{5C22544A-7EE6-4342-B048-85BDC9FD1C3A}</a:tableStyleId>
+              </a:tblPr>
+              <a:tblGrid>
+                <a:gridCol w="3686889"/>
+                <a:gridCol w="3276600"/>
+                <a:gridCol w="2744073"/>
+              </a:tblGrid>
+              <a:tr h="288142">
+                <a:tc>
+                  <a:txBody>
+                    <a:bodyPr/>
+                    <a:lstStyle/>
+                    <a:p>
+                      <a:r>
+                        <a:rPr lang="en-US" sz="2600" dirty="0" err="1" smtClean="0">
+                          <a:latin typeface="Optima" charset="0"/>
+                          <a:ea typeface="Optima" charset="0"/>
+                          <a:cs typeface="Optima" charset="0"/>
+                        </a:rPr>
+                        <a:t>Hyperparameters</a:t>
+                      </a:r>
+                      <a:endParaRPr lang="en-US" sz="2600" dirty="0">
+                        <a:latin typeface="Optima" charset="0"/>
+                        <a:ea typeface="Optima" charset="0"/>
+                        <a:cs typeface="Optima" charset="0"/>
+                      </a:endParaRPr>
+                    </a:p>
+                  </a:txBody>
+                  <a:tcPr/>
+                </a:tc>
+                <a:tc>
+                  <a:txBody>
+                    <a:bodyPr/>
+                    <a:lstStyle/>
+                    <a:p>
+                      <a:r>
+                        <a:rPr lang="en-US" sz="2600" dirty="0" smtClean="0">
+                          <a:latin typeface="Optima" charset="0"/>
+                          <a:ea typeface="Optima" charset="0"/>
+                          <a:cs typeface="Optima" charset="0"/>
+                        </a:rPr>
+                        <a:t>DQN</a:t>
+                      </a:r>
+                      <a:endParaRPr lang="en-US" sz="2600" dirty="0">
+                        <a:latin typeface="Optima" charset="0"/>
+                        <a:ea typeface="Optima" charset="0"/>
+                        <a:cs typeface="Optima" charset="0"/>
+                      </a:endParaRPr>
+                    </a:p>
+                  </a:txBody>
+                  <a:tcPr/>
+                </a:tc>
+                <a:tc>
+                  <a:txBody>
+                    <a:bodyPr/>
+                    <a:lstStyle/>
+                    <a:p>
+                      <a:r>
+                        <a:rPr lang="en-US" sz="2600" dirty="0" smtClean="0">
+                          <a:latin typeface="Optima" charset="0"/>
+                          <a:ea typeface="Optima" charset="0"/>
+                          <a:cs typeface="Optima" charset="0"/>
+                        </a:rPr>
+                        <a:t>DDQN</a:t>
+                      </a:r>
+                      <a:endParaRPr lang="en-US" sz="2600" dirty="0">
+                        <a:latin typeface="Optima" charset="0"/>
+                        <a:ea typeface="Optima" charset="0"/>
+                        <a:cs typeface="Optima" charset="0"/>
+                      </a:endParaRPr>
+                    </a:p>
+                  </a:txBody>
+                  <a:tcPr/>
+                </a:tc>
+              </a:tr>
+              <a:tr h="288142">
+                <a:tc>
+                  <a:txBody>
+                    <a:bodyPr/>
+                    <a:lstStyle/>
+                    <a:p>
+                      <a:r>
+                        <a:rPr lang="en-US" sz="2400" dirty="0" smtClean="0">
+                          <a:latin typeface="Optima" charset="0"/>
+                          <a:ea typeface="Optima" charset="0"/>
+                          <a:cs typeface="Optima" charset="0"/>
+                        </a:rPr>
+                        <a:t>gamma</a:t>
+                      </a:r>
+                      <a:endParaRPr lang="en-US" sz="2400" dirty="0">
+                        <a:latin typeface="Optima" charset="0"/>
+                        <a:ea typeface="Optima" charset="0"/>
+                        <a:cs typeface="Optima" charset="0"/>
+                      </a:endParaRPr>
+                    </a:p>
+                  </a:txBody>
+                  <a:tcPr marT="0" marB="0"/>
+                </a:tc>
+                <a:tc>
+                  <a:txBody>
+                    <a:bodyPr/>
+                    <a:lstStyle/>
+                    <a:p>
+                      <a:r>
+                        <a:rPr lang="en-US" sz="2400" dirty="0" smtClean="0">
+                          <a:latin typeface="Optima" charset="0"/>
+                          <a:ea typeface="Optima" charset="0"/>
+                          <a:cs typeface="Optima" charset="0"/>
+                        </a:rPr>
+                        <a:t>0.99</a:t>
+                      </a:r>
+                      <a:endParaRPr lang="en-US" sz="2400" dirty="0">
+                        <a:latin typeface="Optima" charset="0"/>
+                        <a:ea typeface="Optima" charset="0"/>
+                        <a:cs typeface="Optima" charset="0"/>
+                      </a:endParaRPr>
+                    </a:p>
+                  </a:txBody>
+                  <a:tcPr marT="0" marB="0"/>
+                </a:tc>
+                <a:tc>
+                  <a:txBody>
+                    <a:bodyPr/>
+                    <a:lstStyle/>
+                    <a:p>
+                      <a:endParaRPr lang="en-US" sz="2400" dirty="0">
+                        <a:latin typeface="Optima" charset="0"/>
+                        <a:ea typeface="Optima" charset="0"/>
+                        <a:cs typeface="Optima" charset="0"/>
+                      </a:endParaRPr>
+                    </a:p>
+                  </a:txBody>
+                  <a:tcPr marT="0" marB="0"/>
+                </a:tc>
+              </a:tr>
+              <a:tr h="288142">
+                <a:tc>
+                  <a:txBody>
+                    <a:bodyPr/>
+                    <a:lstStyle/>
+                    <a:p>
+                      <a:r>
+                        <a:rPr lang="en-US" sz="2400" dirty="0" smtClean="0">
+                          <a:latin typeface="Optima" charset="0"/>
+                          <a:ea typeface="Optima" charset="0"/>
+                          <a:cs typeface="Optima" charset="0"/>
+                        </a:rPr>
+                        <a:t>Epsilon(max, min, decay)</a:t>
+                      </a:r>
+                      <a:endParaRPr lang="en-US" sz="2400" dirty="0">
+                        <a:latin typeface="Optima" charset="0"/>
+                        <a:ea typeface="Optima" charset="0"/>
+                        <a:cs typeface="Optima" charset="0"/>
+                      </a:endParaRPr>
+                    </a:p>
+                  </a:txBody>
+                  <a:tcPr marT="0" marB="0"/>
+                </a:tc>
+                <a:tc>
+                  <a:txBody>
+                    <a:bodyPr/>
+                    <a:lstStyle/>
+                    <a:p>
+                      <a:r>
+                        <a:rPr lang="en-US" sz="2400" dirty="0" smtClean="0">
+                          <a:latin typeface="Optima" charset="0"/>
+                          <a:ea typeface="Optima" charset="0"/>
+                          <a:cs typeface="Optima" charset="0"/>
+                        </a:rPr>
+                        <a:t>(1, 0,</a:t>
+                      </a:r>
+                      <a:r>
+                        <a:rPr lang="en-US" sz="2400" baseline="0" dirty="0" smtClean="0">
+                          <a:latin typeface="Optima" charset="0"/>
+                          <a:ea typeface="Optima" charset="0"/>
+                          <a:cs typeface="Optima" charset="0"/>
+                        </a:rPr>
+                        <a:t> 0.998)</a:t>
+                      </a:r>
+                      <a:endParaRPr lang="en-US" sz="2400" dirty="0">
+                        <a:latin typeface="Optima" charset="0"/>
+                        <a:ea typeface="Optima" charset="0"/>
+                        <a:cs typeface="Optima" charset="0"/>
+                      </a:endParaRPr>
+                    </a:p>
+                  </a:txBody>
+                  <a:tcPr marT="0" marB="0"/>
+                </a:tc>
+                <a:tc>
+                  <a:txBody>
+                    <a:bodyPr/>
+                    <a:lstStyle/>
+                    <a:p>
+                      <a:endParaRPr lang="en-US" sz="2400" dirty="0">
+                        <a:latin typeface="Optima" charset="0"/>
+                        <a:ea typeface="Optima" charset="0"/>
+                        <a:cs typeface="Optima" charset="0"/>
+                      </a:endParaRPr>
+                    </a:p>
+                  </a:txBody>
+                  <a:tcPr marT="0" marB="0"/>
+                </a:tc>
+              </a:tr>
+              <a:tr h="288142">
+                <a:tc>
+                  <a:txBody>
+                    <a:bodyPr/>
+                    <a:lstStyle/>
+                    <a:p>
+                      <a:r>
+                        <a:rPr lang="en-US" sz="2400" dirty="0" smtClean="0">
+                          <a:latin typeface="Optima" charset="0"/>
+                          <a:ea typeface="Optima" charset="0"/>
+                          <a:cs typeface="Optima" charset="0"/>
+                        </a:rPr>
+                        <a:t>Learning Rate</a:t>
+                      </a:r>
+                      <a:endParaRPr lang="en-US" sz="2400" dirty="0">
+                        <a:latin typeface="Optima" charset="0"/>
+                        <a:ea typeface="Optima" charset="0"/>
+                        <a:cs typeface="Optima" charset="0"/>
+                      </a:endParaRPr>
+                    </a:p>
+                  </a:txBody>
+                  <a:tcPr marT="0" marB="0"/>
+                </a:tc>
+                <a:tc>
+                  <a:txBody>
+                    <a:bodyPr/>
+                    <a:lstStyle/>
+                    <a:p>
+                      <a:r>
+                        <a:rPr lang="en-US" sz="2400" dirty="0" smtClean="0">
+                          <a:latin typeface="Optima" charset="0"/>
+                          <a:ea typeface="Optima" charset="0"/>
+                          <a:cs typeface="Optima" charset="0"/>
+                        </a:rPr>
+                        <a:t>0.0001</a:t>
+                      </a:r>
+                      <a:endParaRPr lang="en-US" sz="2400" dirty="0">
+                        <a:latin typeface="Optima" charset="0"/>
+                        <a:ea typeface="Optima" charset="0"/>
+                        <a:cs typeface="Optima" charset="0"/>
+                      </a:endParaRPr>
+                    </a:p>
+                  </a:txBody>
+                  <a:tcPr marT="0" marB="0"/>
+                </a:tc>
+                <a:tc>
+                  <a:txBody>
+                    <a:bodyPr/>
+                    <a:lstStyle/>
+                    <a:p>
+                      <a:endParaRPr lang="en-US" sz="2400" dirty="0">
+                        <a:latin typeface="Optima" charset="0"/>
+                        <a:ea typeface="Optima" charset="0"/>
+                        <a:cs typeface="Optima" charset="0"/>
+                      </a:endParaRPr>
+                    </a:p>
+                  </a:txBody>
+                  <a:tcPr marT="0" marB="0"/>
+                </a:tc>
+              </a:tr>
+              <a:tr h="288142">
+                <a:tc>
+                  <a:txBody>
+                    <a:bodyPr/>
+                    <a:lstStyle/>
+                    <a:p>
+                      <a:r>
+                        <a:rPr lang="en-US" sz="2400" dirty="0" smtClean="0">
+                          <a:latin typeface="Optima" charset="0"/>
+                          <a:ea typeface="Optima" charset="0"/>
+                          <a:cs typeface="Optima" charset="0"/>
+                        </a:rPr>
+                        <a:t>DNN layers</a:t>
+                      </a:r>
+                      <a:endParaRPr lang="en-US" sz="2400" dirty="0">
+                        <a:latin typeface="Optima" charset="0"/>
+                        <a:ea typeface="Optima" charset="0"/>
+                        <a:cs typeface="Optima" charset="0"/>
+                      </a:endParaRPr>
+                    </a:p>
+                  </a:txBody>
+                  <a:tcPr marT="0" marB="0"/>
+                </a:tc>
+                <a:tc>
+                  <a:txBody>
+                    <a:bodyPr/>
+                    <a:lstStyle/>
+                    <a:p>
+                      <a:r>
+                        <a:rPr lang="en-US" sz="2400" dirty="0" smtClean="0">
+                          <a:latin typeface="Optima" charset="0"/>
+                          <a:ea typeface="Optima" charset="0"/>
+                          <a:cs typeface="Optima" charset="0"/>
+                        </a:rPr>
+                        <a:t>[Dense128,</a:t>
+                      </a:r>
+                      <a:r>
+                        <a:rPr lang="en-US" sz="2400" baseline="0" dirty="0" smtClean="0">
+                          <a:latin typeface="Optima" charset="0"/>
+                          <a:ea typeface="Optima" charset="0"/>
+                          <a:cs typeface="Optima" charset="0"/>
+                        </a:rPr>
+                        <a:t> Dense64]</a:t>
+                      </a:r>
+                      <a:endParaRPr lang="en-US" sz="2400" dirty="0">
+                        <a:latin typeface="Optima" charset="0"/>
+                        <a:ea typeface="Optima" charset="0"/>
+                        <a:cs typeface="Optima" charset="0"/>
+                      </a:endParaRPr>
+                    </a:p>
+                  </a:txBody>
+                  <a:tcPr marT="0" marB="0"/>
+                </a:tc>
+                <a:tc>
+                  <a:txBody>
+                    <a:bodyPr/>
+                    <a:lstStyle/>
+                    <a:p>
+                      <a:endParaRPr lang="en-US" sz="2400" dirty="0">
+                        <a:latin typeface="Optima" charset="0"/>
+                        <a:ea typeface="Optima" charset="0"/>
+                        <a:cs typeface="Optima" charset="0"/>
+                      </a:endParaRPr>
+                    </a:p>
+                  </a:txBody>
+                  <a:tcPr marT="0" marB="0"/>
+                </a:tc>
+              </a:tr>
+              <a:tr h="288142">
+                <a:tc>
+                  <a:txBody>
+                    <a:bodyPr/>
+                    <a:lstStyle/>
+                    <a:p>
+                      <a:pPr marL="0" marR="0" indent="0" algn="l" defTabSz="2717218" rtl="0" eaLnBrk="1" fontAlgn="auto" latinLnBrk="0" hangingPunct="1">
+                        <a:lnSpc>
+                          <a:spcPct val="100000"/>
+                        </a:lnSpc>
+                        <a:spcBef>
+                          <a:spcPts val="0"/>
+                        </a:spcBef>
+                        <a:spcAft>
+                          <a:spcPts val="0"/>
+                        </a:spcAft>
+                        <a:buClrTx/>
+                        <a:buSzTx/>
+                        <a:buFontTx/>
+                        <a:buNone/>
+                        <a:tabLst/>
+                        <a:defRPr/>
+                      </a:pPr>
+                      <a:r>
+                        <a:rPr lang="en-US" sz="2400" dirty="0" smtClean="0">
+                          <a:latin typeface="Optima" charset="0"/>
+                          <a:ea typeface="Optima" charset="0"/>
+                          <a:cs typeface="Optima" charset="0"/>
+                        </a:rPr>
+                        <a:t>Loss function</a:t>
+                      </a:r>
+                    </a:p>
+                  </a:txBody>
+                  <a:tcPr marT="0" marB="0"/>
+                </a:tc>
+                <a:tc>
+                  <a:txBody>
+                    <a:bodyPr/>
+                    <a:lstStyle/>
+                    <a:p>
+                      <a:r>
+                        <a:rPr lang="en-US" sz="2400" dirty="0" smtClean="0">
+                          <a:latin typeface="Optima" charset="0"/>
+                          <a:ea typeface="Optima" charset="0"/>
+                          <a:cs typeface="Optima" charset="0"/>
+                        </a:rPr>
+                        <a:t>MSE</a:t>
+                      </a:r>
+                      <a:endParaRPr lang="en-US" sz="2400" dirty="0">
+                        <a:latin typeface="Optima" charset="0"/>
+                        <a:ea typeface="Optima" charset="0"/>
+                        <a:cs typeface="Optima" charset="0"/>
+                      </a:endParaRPr>
+                    </a:p>
+                  </a:txBody>
+                  <a:tcPr marT="0" marB="0"/>
+                </a:tc>
+                <a:tc>
+                  <a:txBody>
+                    <a:bodyPr/>
+                    <a:lstStyle/>
+                    <a:p>
+                      <a:endParaRPr lang="en-US" sz="2400" dirty="0">
+                        <a:latin typeface="Optima" charset="0"/>
+                        <a:ea typeface="Optima" charset="0"/>
+                        <a:cs typeface="Optima" charset="0"/>
+                      </a:endParaRPr>
+                    </a:p>
+                  </a:txBody>
+                  <a:tcPr marT="0" marB="0"/>
+                </a:tc>
+              </a:tr>
+              <a:tr h="288142">
+                <a:tc>
+                  <a:txBody>
+                    <a:bodyPr/>
+                    <a:lstStyle/>
+                    <a:p>
+                      <a:r>
+                        <a:rPr lang="en-US" sz="2400" dirty="0" smtClean="0">
+                          <a:latin typeface="Optima" charset="0"/>
+                          <a:ea typeface="Optima" charset="0"/>
+                          <a:cs typeface="Optima" charset="0"/>
+                        </a:rPr>
+                        <a:t>Batch</a:t>
+                      </a:r>
+                      <a:endParaRPr lang="en-US" sz="2400" dirty="0">
+                        <a:latin typeface="Optima" charset="0"/>
+                        <a:ea typeface="Optima" charset="0"/>
+                        <a:cs typeface="Optima" charset="0"/>
+                      </a:endParaRPr>
+                    </a:p>
+                  </a:txBody>
+                  <a:tcPr marT="0" marB="0"/>
+                </a:tc>
+                <a:tc>
+                  <a:txBody>
+                    <a:bodyPr/>
+                    <a:lstStyle/>
+                    <a:p>
+                      <a:r>
+                        <a:rPr lang="en-US" sz="2400" dirty="0" smtClean="0">
+                          <a:latin typeface="Optima" charset="0"/>
+                          <a:ea typeface="Optima" charset="0"/>
+                          <a:cs typeface="Optima" charset="0"/>
+                        </a:rPr>
+                        <a:t>2^5</a:t>
+                      </a:r>
+                      <a:endParaRPr lang="en-US" sz="2400" dirty="0">
+                        <a:latin typeface="Optima" charset="0"/>
+                        <a:ea typeface="Optima" charset="0"/>
+                        <a:cs typeface="Optima" charset="0"/>
+                      </a:endParaRPr>
+                    </a:p>
+                  </a:txBody>
+                  <a:tcPr marT="0" marB="0"/>
+                </a:tc>
+                <a:tc>
+                  <a:txBody>
+                    <a:bodyPr/>
+                    <a:lstStyle/>
+                    <a:p>
+                      <a:endParaRPr lang="en-US" sz="2400" dirty="0">
+                        <a:latin typeface="Optima" charset="0"/>
+                        <a:ea typeface="Optima" charset="0"/>
+                        <a:cs typeface="Optima" charset="0"/>
+                      </a:endParaRPr>
+                    </a:p>
+                  </a:txBody>
+                  <a:tcPr marT="0" marB="0"/>
+                </a:tc>
+              </a:tr>
+              <a:tr h="288142">
+                <a:tc>
+                  <a:txBody>
+                    <a:bodyPr/>
+                    <a:lstStyle/>
+                    <a:p>
+                      <a:r>
+                        <a:rPr lang="en-US" sz="2400" dirty="0" smtClean="0">
+                          <a:latin typeface="Optima" charset="0"/>
+                          <a:ea typeface="Optima" charset="0"/>
+                          <a:cs typeface="Optima" charset="0"/>
+                        </a:rPr>
+                        <a:t>Replay Memory Size</a:t>
+                      </a:r>
+                      <a:endParaRPr lang="en-US" sz="2400" dirty="0">
+                        <a:latin typeface="Optima" charset="0"/>
+                        <a:ea typeface="Optima" charset="0"/>
+                        <a:cs typeface="Optima" charset="0"/>
+                      </a:endParaRPr>
+                    </a:p>
+                  </a:txBody>
+                  <a:tcPr marT="0" marB="0"/>
+                </a:tc>
+                <a:tc>
+                  <a:txBody>
+                    <a:bodyPr/>
+                    <a:lstStyle/>
+                    <a:p>
+                      <a:r>
+                        <a:rPr lang="en-US" sz="2400" dirty="0" smtClean="0">
+                          <a:latin typeface="Optima" charset="0"/>
+                          <a:ea typeface="Optima" charset="0"/>
+                          <a:cs typeface="Optima" charset="0"/>
+                        </a:rPr>
+                        <a:t>2^16</a:t>
+                      </a:r>
+                      <a:endParaRPr lang="en-US" sz="2400" dirty="0">
+                        <a:latin typeface="Optima" charset="0"/>
+                        <a:ea typeface="Optima" charset="0"/>
+                        <a:cs typeface="Optima" charset="0"/>
+                      </a:endParaRPr>
+                    </a:p>
+                  </a:txBody>
+                  <a:tcPr marT="0" marB="0"/>
+                </a:tc>
+                <a:tc>
+                  <a:txBody>
+                    <a:bodyPr/>
+                    <a:lstStyle/>
+                    <a:p>
+                      <a:endParaRPr lang="en-US" sz="2400" dirty="0">
+                        <a:latin typeface="Optima" charset="0"/>
+                        <a:ea typeface="Optima" charset="0"/>
+                        <a:cs typeface="Optima" charset="0"/>
+                      </a:endParaRPr>
+                    </a:p>
+                  </a:txBody>
+                  <a:tcPr marT="0" marB="0"/>
+                </a:tc>
+              </a:tr>
+            </a:tbl>
+          </a:graphicData>
+        </a:graphic>
+      </p:graphicFrame>
     </p:spTree>
   </p:cSld>
   <p:clrMapOvr>
@@ -15093,7 +16010,7 @@
             <a:lstStyle/>
             <a:p>
               <a:r>
-                <a:rPr lang="en-US" sz="4000" smtClean="0">
+                <a:rPr lang="en-US" sz="4000" dirty="0" smtClean="0">
                   <a:latin typeface="Optima" charset="0"/>
                   <a:ea typeface="Optima" charset="0"/>
                   <a:cs typeface="Optima" charset="0"/>
@@ -15177,6 +16094,473 @@
     <p:extLst>
       <p:ext uri="{BB962C8B-B14F-4D97-AF65-F5344CB8AC3E}">
         <p14:creationId xmlns:p14="http://schemas.microsoft.com/office/powerpoint/2010/main" val="326593527"/>
+      </p:ext>
+    </p:extLst>
+  </p:cSld>
+  <p:clrMapOvr>
+    <a:masterClrMapping/>
+  </p:clrMapOvr>
+</p:sld>
+</file>
+
+<file path=ppt/slides/slide4.xml><?xml version="1.0" encoding="utf-8"?>
+<p:sld xmlns:a="http://schemas.openxmlformats.org/drawingml/2006/main" xmlns:r="http://schemas.openxmlformats.org/officeDocument/2006/relationships" xmlns:p="http://schemas.openxmlformats.org/presentationml/2006/main">
+  <p:cSld>
+    <p:spTree>
+      <p:nvGrpSpPr>
+        <p:cNvPr id="1" name=""/>
+        <p:cNvGrpSpPr/>
+        <p:nvPr/>
+      </p:nvGrpSpPr>
+      <p:grpSpPr>
+        <a:xfrm>
+          <a:off x="0" y="0"/>
+          <a:ext cx="0" cy="0"/>
+          <a:chOff x="0" y="0"/>
+          <a:chExt cx="0" cy="0"/>
+        </a:xfrm>
+      </p:grpSpPr>
+      <p:sp>
+        <p:nvSpPr>
+          <p:cNvPr id="2" name="Title 1"/>
+          <p:cNvSpPr>
+            <a:spLocks noGrp="1"/>
+          </p:cNvSpPr>
+          <p:nvPr>
+            <p:ph type="title"/>
+          </p:nvPr>
+        </p:nvSpPr>
+        <p:spPr/>
+        <p:txBody>
+          <a:bodyPr/>
+          <a:lstStyle/>
+          <a:p>
+            <a:endParaRPr lang="en-US"/>
+          </a:p>
+        </p:txBody>
+      </p:sp>
+      <p:graphicFrame>
+        <p:nvGraphicFramePr>
+          <p:cNvPr id="6" name="Content Placeholder 5"/>
+          <p:cNvGraphicFramePr>
+            <a:graphicFrameLocks noGrp="1"/>
+          </p:cNvGraphicFramePr>
+          <p:nvPr>
+            <p:ph idx="1"/>
+            <p:extLst>
+              <p:ext uri="{D42A27DB-BD31-4B8C-83A1-F6EECF244321}">
+                <p14:modId xmlns:p14="http://schemas.microsoft.com/office/powerpoint/2010/main" val="828527267"/>
+              </p:ext>
+            </p:extLst>
+          </p:nvPr>
+        </p:nvGraphicFramePr>
+        <p:xfrm>
+          <a:off x="1646238" y="5119688"/>
+          <a:ext cx="5897562" cy="4297680"/>
+        </p:xfrm>
+        <a:graphic>
+          <a:graphicData uri="http://schemas.openxmlformats.org/drawingml/2006/table">
+            <a:tbl>
+              <a:tblPr firstRow="1" bandRow="1">
+                <a:tableStyleId>{5C22544A-7EE6-4342-B048-85BDC9FD1C3A}</a:tableStyleId>
+              </a:tblPr>
+              <a:tblGrid>
+                <a:gridCol w="1965854"/>
+                <a:gridCol w="1965854"/>
+                <a:gridCol w="1965854"/>
+              </a:tblGrid>
+              <a:tr h="370840">
+                <a:tc>
+                  <a:txBody>
+                    <a:bodyPr/>
+                    <a:lstStyle/>
+                    <a:p>
+                      <a:r>
+                        <a:rPr lang="en-US" sz="2600" dirty="0" err="1" smtClean="0">
+                          <a:latin typeface="Optima" charset="0"/>
+                          <a:ea typeface="Optima" charset="0"/>
+                          <a:cs typeface="Optima" charset="0"/>
+                        </a:rPr>
+                        <a:t>Hyperparameters</a:t>
+                      </a:r>
+                      <a:endParaRPr lang="en-US" sz="2600" dirty="0">
+                        <a:latin typeface="Optima" charset="0"/>
+                        <a:ea typeface="Optima" charset="0"/>
+                        <a:cs typeface="Optima" charset="0"/>
+                      </a:endParaRPr>
+                    </a:p>
+                  </a:txBody>
+                  <a:tcPr/>
+                </a:tc>
+                <a:tc>
+                  <a:txBody>
+                    <a:bodyPr/>
+                    <a:lstStyle/>
+                    <a:p>
+                      <a:r>
+                        <a:rPr lang="en-US" sz="2600" dirty="0" smtClean="0">
+                          <a:latin typeface="Optima" charset="0"/>
+                          <a:ea typeface="Optima" charset="0"/>
+                          <a:cs typeface="Optima" charset="0"/>
+                        </a:rPr>
+                        <a:t>DQN</a:t>
+                      </a:r>
+                      <a:endParaRPr lang="en-US" sz="2600" dirty="0">
+                        <a:latin typeface="Optima" charset="0"/>
+                        <a:ea typeface="Optima" charset="0"/>
+                        <a:cs typeface="Optima" charset="0"/>
+                      </a:endParaRPr>
+                    </a:p>
+                  </a:txBody>
+                  <a:tcPr/>
+                </a:tc>
+                <a:tc>
+                  <a:txBody>
+                    <a:bodyPr/>
+                    <a:lstStyle/>
+                    <a:p>
+                      <a:r>
+                        <a:rPr lang="en-US" sz="2600" dirty="0" smtClean="0">
+                          <a:latin typeface="Optima" charset="0"/>
+                          <a:ea typeface="Optima" charset="0"/>
+                          <a:cs typeface="Optima" charset="0"/>
+                        </a:rPr>
+                        <a:t>DDQN</a:t>
+                      </a:r>
+                      <a:endParaRPr lang="en-US" sz="2600" dirty="0">
+                        <a:latin typeface="Optima" charset="0"/>
+                        <a:ea typeface="Optima" charset="0"/>
+                        <a:cs typeface="Optima" charset="0"/>
+                      </a:endParaRPr>
+                    </a:p>
+                  </a:txBody>
+                  <a:tcPr/>
+                </a:tc>
+              </a:tr>
+              <a:tr h="370840">
+                <a:tc>
+                  <a:txBody>
+                    <a:bodyPr/>
+                    <a:lstStyle/>
+                    <a:p>
+                      <a:r>
+                        <a:rPr lang="en-US" sz="2600" dirty="0" smtClean="0">
+                          <a:latin typeface="Optima" charset="0"/>
+                          <a:ea typeface="Optima" charset="0"/>
+                          <a:cs typeface="Optima" charset="0"/>
+                        </a:rPr>
+                        <a:t>gamma</a:t>
+                      </a:r>
+                      <a:endParaRPr lang="en-US" sz="2600" dirty="0">
+                        <a:latin typeface="Optima" charset="0"/>
+                        <a:ea typeface="Optima" charset="0"/>
+                        <a:cs typeface="Optima" charset="0"/>
+                      </a:endParaRPr>
+                    </a:p>
+                  </a:txBody>
+                  <a:tcPr/>
+                </a:tc>
+                <a:tc>
+                  <a:txBody>
+                    <a:bodyPr/>
+                    <a:lstStyle/>
+                    <a:p>
+                      <a:endParaRPr lang="en-US" sz="2600">
+                        <a:latin typeface="Optima" charset="0"/>
+                        <a:ea typeface="Optima" charset="0"/>
+                        <a:cs typeface="Optima" charset="0"/>
+                      </a:endParaRPr>
+                    </a:p>
+                  </a:txBody>
+                  <a:tcPr/>
+                </a:tc>
+                <a:tc>
+                  <a:txBody>
+                    <a:bodyPr/>
+                    <a:lstStyle/>
+                    <a:p>
+                      <a:endParaRPr lang="en-US" sz="2600">
+                        <a:latin typeface="Optima" charset="0"/>
+                        <a:ea typeface="Optima" charset="0"/>
+                        <a:cs typeface="Optima" charset="0"/>
+                      </a:endParaRPr>
+                    </a:p>
+                  </a:txBody>
+                  <a:tcPr/>
+                </a:tc>
+              </a:tr>
+              <a:tr h="370840">
+                <a:tc>
+                  <a:txBody>
+                    <a:bodyPr/>
+                    <a:lstStyle/>
+                    <a:p>
+                      <a:endParaRPr lang="en-US" sz="2600">
+                        <a:latin typeface="Optima" charset="0"/>
+                        <a:ea typeface="Optima" charset="0"/>
+                        <a:cs typeface="Optima" charset="0"/>
+                      </a:endParaRPr>
+                    </a:p>
+                  </a:txBody>
+                  <a:tcPr/>
+                </a:tc>
+                <a:tc>
+                  <a:txBody>
+                    <a:bodyPr/>
+                    <a:lstStyle/>
+                    <a:p>
+                      <a:endParaRPr lang="en-US" sz="2600">
+                        <a:latin typeface="Optima" charset="0"/>
+                        <a:ea typeface="Optima" charset="0"/>
+                        <a:cs typeface="Optima" charset="0"/>
+                      </a:endParaRPr>
+                    </a:p>
+                  </a:txBody>
+                  <a:tcPr/>
+                </a:tc>
+                <a:tc>
+                  <a:txBody>
+                    <a:bodyPr/>
+                    <a:lstStyle/>
+                    <a:p>
+                      <a:endParaRPr lang="en-US" sz="2600">
+                        <a:latin typeface="Optima" charset="0"/>
+                        <a:ea typeface="Optima" charset="0"/>
+                        <a:cs typeface="Optima" charset="0"/>
+                      </a:endParaRPr>
+                    </a:p>
+                  </a:txBody>
+                  <a:tcPr/>
+                </a:tc>
+              </a:tr>
+              <a:tr h="370840">
+                <a:tc>
+                  <a:txBody>
+                    <a:bodyPr/>
+                    <a:lstStyle/>
+                    <a:p>
+                      <a:endParaRPr lang="en-US" sz="2600">
+                        <a:latin typeface="Optima" charset="0"/>
+                        <a:ea typeface="Optima" charset="0"/>
+                        <a:cs typeface="Optima" charset="0"/>
+                      </a:endParaRPr>
+                    </a:p>
+                  </a:txBody>
+                  <a:tcPr/>
+                </a:tc>
+                <a:tc>
+                  <a:txBody>
+                    <a:bodyPr/>
+                    <a:lstStyle/>
+                    <a:p>
+                      <a:endParaRPr lang="en-US" sz="2600">
+                        <a:latin typeface="Optima" charset="0"/>
+                        <a:ea typeface="Optima" charset="0"/>
+                        <a:cs typeface="Optima" charset="0"/>
+                      </a:endParaRPr>
+                    </a:p>
+                  </a:txBody>
+                  <a:tcPr/>
+                </a:tc>
+                <a:tc>
+                  <a:txBody>
+                    <a:bodyPr/>
+                    <a:lstStyle/>
+                    <a:p>
+                      <a:endParaRPr lang="en-US" sz="2600">
+                        <a:latin typeface="Optima" charset="0"/>
+                        <a:ea typeface="Optima" charset="0"/>
+                        <a:cs typeface="Optima" charset="0"/>
+                      </a:endParaRPr>
+                    </a:p>
+                  </a:txBody>
+                  <a:tcPr/>
+                </a:tc>
+              </a:tr>
+              <a:tr h="370840">
+                <a:tc>
+                  <a:txBody>
+                    <a:bodyPr/>
+                    <a:lstStyle/>
+                    <a:p>
+                      <a:endParaRPr lang="en-US" sz="2600">
+                        <a:latin typeface="Optima" charset="0"/>
+                        <a:ea typeface="Optima" charset="0"/>
+                        <a:cs typeface="Optima" charset="0"/>
+                      </a:endParaRPr>
+                    </a:p>
+                  </a:txBody>
+                  <a:tcPr/>
+                </a:tc>
+                <a:tc>
+                  <a:txBody>
+                    <a:bodyPr/>
+                    <a:lstStyle/>
+                    <a:p>
+                      <a:endParaRPr lang="en-US" sz="2600">
+                        <a:latin typeface="Optima" charset="0"/>
+                        <a:ea typeface="Optima" charset="0"/>
+                        <a:cs typeface="Optima" charset="0"/>
+                      </a:endParaRPr>
+                    </a:p>
+                  </a:txBody>
+                  <a:tcPr/>
+                </a:tc>
+                <a:tc>
+                  <a:txBody>
+                    <a:bodyPr/>
+                    <a:lstStyle/>
+                    <a:p>
+                      <a:endParaRPr lang="en-US" sz="2600">
+                        <a:latin typeface="Optima" charset="0"/>
+                        <a:ea typeface="Optima" charset="0"/>
+                        <a:cs typeface="Optima" charset="0"/>
+                      </a:endParaRPr>
+                    </a:p>
+                  </a:txBody>
+                  <a:tcPr/>
+                </a:tc>
+              </a:tr>
+              <a:tr h="370840">
+                <a:tc>
+                  <a:txBody>
+                    <a:bodyPr/>
+                    <a:lstStyle/>
+                    <a:p>
+                      <a:endParaRPr lang="en-US" sz="2600">
+                        <a:latin typeface="Optima" charset="0"/>
+                        <a:ea typeface="Optima" charset="0"/>
+                        <a:cs typeface="Optima" charset="0"/>
+                      </a:endParaRPr>
+                    </a:p>
+                  </a:txBody>
+                  <a:tcPr/>
+                </a:tc>
+                <a:tc>
+                  <a:txBody>
+                    <a:bodyPr/>
+                    <a:lstStyle/>
+                    <a:p>
+                      <a:endParaRPr lang="en-US" sz="2600">
+                        <a:latin typeface="Optima" charset="0"/>
+                        <a:ea typeface="Optima" charset="0"/>
+                        <a:cs typeface="Optima" charset="0"/>
+                      </a:endParaRPr>
+                    </a:p>
+                  </a:txBody>
+                  <a:tcPr/>
+                </a:tc>
+                <a:tc>
+                  <a:txBody>
+                    <a:bodyPr/>
+                    <a:lstStyle/>
+                    <a:p>
+                      <a:endParaRPr lang="en-US" sz="2600">
+                        <a:latin typeface="Optima" charset="0"/>
+                        <a:ea typeface="Optima" charset="0"/>
+                        <a:cs typeface="Optima" charset="0"/>
+                      </a:endParaRPr>
+                    </a:p>
+                  </a:txBody>
+                  <a:tcPr/>
+                </a:tc>
+              </a:tr>
+              <a:tr h="370840">
+                <a:tc>
+                  <a:txBody>
+                    <a:bodyPr/>
+                    <a:lstStyle/>
+                    <a:p>
+                      <a:endParaRPr lang="en-US" sz="2600">
+                        <a:latin typeface="Optima" charset="0"/>
+                        <a:ea typeface="Optima" charset="0"/>
+                        <a:cs typeface="Optima" charset="0"/>
+                      </a:endParaRPr>
+                    </a:p>
+                  </a:txBody>
+                  <a:tcPr/>
+                </a:tc>
+                <a:tc>
+                  <a:txBody>
+                    <a:bodyPr/>
+                    <a:lstStyle/>
+                    <a:p>
+                      <a:endParaRPr lang="en-US" sz="2600">
+                        <a:latin typeface="Optima" charset="0"/>
+                        <a:ea typeface="Optima" charset="0"/>
+                        <a:cs typeface="Optima" charset="0"/>
+                      </a:endParaRPr>
+                    </a:p>
+                  </a:txBody>
+                  <a:tcPr/>
+                </a:tc>
+                <a:tc>
+                  <a:txBody>
+                    <a:bodyPr/>
+                    <a:lstStyle/>
+                    <a:p>
+                      <a:endParaRPr lang="en-US" sz="2600">
+                        <a:latin typeface="Optima" charset="0"/>
+                        <a:ea typeface="Optima" charset="0"/>
+                        <a:cs typeface="Optima" charset="0"/>
+                      </a:endParaRPr>
+                    </a:p>
+                  </a:txBody>
+                  <a:tcPr/>
+                </a:tc>
+              </a:tr>
+              <a:tr h="370840">
+                <a:tc>
+                  <a:txBody>
+                    <a:bodyPr/>
+                    <a:lstStyle/>
+                    <a:p>
+                      <a:endParaRPr lang="en-US" sz="2600">
+                        <a:latin typeface="Optima" charset="0"/>
+                        <a:ea typeface="Optima" charset="0"/>
+                        <a:cs typeface="Optima" charset="0"/>
+                      </a:endParaRPr>
+                    </a:p>
+                  </a:txBody>
+                  <a:tcPr/>
+                </a:tc>
+                <a:tc>
+                  <a:txBody>
+                    <a:bodyPr/>
+                    <a:lstStyle/>
+                    <a:p>
+                      <a:endParaRPr lang="en-US" sz="2600">
+                        <a:latin typeface="Optima" charset="0"/>
+                        <a:ea typeface="Optima" charset="0"/>
+                        <a:cs typeface="Optima" charset="0"/>
+                      </a:endParaRPr>
+                    </a:p>
+                  </a:txBody>
+                  <a:tcPr/>
+                </a:tc>
+                <a:tc>
+                  <a:txBody>
+                    <a:bodyPr/>
+                    <a:lstStyle/>
+                    <a:p>
+                      <a:endParaRPr lang="en-US" sz="2600" dirty="0">
+                        <a:latin typeface="Optima" charset="0"/>
+                        <a:ea typeface="Optima" charset="0"/>
+                        <a:cs typeface="Optima" charset="0"/>
+                      </a:endParaRPr>
+                    </a:p>
+                  </a:txBody>
+                  <a:tcPr/>
+                </a:tc>
+              </a:tr>
+            </a:tbl>
+          </a:graphicData>
+        </a:graphic>
+      </p:graphicFrame>
+    </p:spTree>
+    <p:extLst>
+      <p:ext uri="{BB962C8B-B14F-4D97-AF65-F5344CB8AC3E}">
+        <p14:creationId xmlns:p14="http://schemas.microsoft.com/office/powerpoint/2010/main" val="1753553357"/>
       </p:ext>
     </p:extLst>
   </p:cSld>

</xml_diff>